<commit_message>
Arbitrary を Any に変更
</commit_message>
<xml_diff>
--- a/MarketplaceDatas/MediaGallery.pptx
+++ b/MarketplaceDatas/MediaGallery.pptx
@@ -263,7 +263,7 @@
           <a:p>
             <a:fld id="{35554232-8B70-45B2-B90B-76A05A555CB1}" type="datetimeFigureOut">
               <a:rPr kumimoji="1" lang="ja-JP" altLang="en-US" smtClean="0"/>
-              <a:t>2024/9/30</a:t>
+              <a:t>2024/10/2</a:t>
             </a:fld>
             <a:endParaRPr kumimoji="1" lang="ja-JP" altLang="en-US"/>
           </a:p>
@@ -566,7 +566,7 @@
           <a:p>
             <a:fld id="{35554232-8B70-45B2-B90B-76A05A555CB1}" type="datetimeFigureOut">
               <a:rPr kumimoji="1" lang="ja-JP" altLang="en-US" smtClean="0"/>
-              <a:t>2024/9/30</a:t>
+              <a:t>2024/10/2</a:t>
             </a:fld>
             <a:endParaRPr kumimoji="1" lang="ja-JP" altLang="en-US"/>
           </a:p>
@@ -3713,10 +3713,10 @@
       </p:grpSpPr>
       <p:pic>
         <p:nvPicPr>
-          <p:cNvPr id="8" name="図 7">
-            <a:extLst>
-              <a:ext uri="{FF2B5EF4-FFF2-40B4-BE49-F238E27FC236}">
-                <a16:creationId xmlns:a16="http://schemas.microsoft.com/office/drawing/2014/main" id="{84353A0B-1BC3-4A68-8BE6-0657699A5F94}"/>
+          <p:cNvPr id="9" name="図 8">
+            <a:extLst>
+              <a:ext uri="{FF2B5EF4-FFF2-40B4-BE49-F238E27FC236}">
+                <a16:creationId xmlns:a16="http://schemas.microsoft.com/office/drawing/2014/main" id="{CE256E02-2437-B42A-89DD-691492CAC99A}"/>
               </a:ext>
             </a:extLst>
           </p:cNvPr>
@@ -3727,36 +3727,6 @@
         </p:nvPicPr>
         <p:blipFill>
           <a:blip r:embed="rId2"/>
-          <a:stretch>
-            <a:fillRect/>
-          </a:stretch>
-        </p:blipFill>
-        <p:spPr>
-          <a:xfrm>
-            <a:off x="828401" y="2245893"/>
-            <a:ext cx="3924848" cy="3943900"/>
-          </a:xfrm>
-          <a:prstGeom prst="rect">
-            <a:avLst/>
-          </a:prstGeom>
-        </p:spPr>
-      </p:pic>
-      <p:pic>
-        <p:nvPicPr>
-          <p:cNvPr id="9" name="図 8">
-            <a:extLst>
-              <a:ext uri="{FF2B5EF4-FFF2-40B4-BE49-F238E27FC236}">
-                <a16:creationId xmlns:a16="http://schemas.microsoft.com/office/drawing/2014/main" id="{CE256E02-2437-B42A-89DD-691492CAC99A}"/>
-              </a:ext>
-            </a:extLst>
-          </p:cNvPr>
-          <p:cNvPicPr>
-            <a:picLocks noChangeAspect="1"/>
-          </p:cNvPicPr>
-          <p:nvPr/>
-        </p:nvPicPr>
-        <p:blipFill>
-          <a:blip r:embed="rId3"/>
           <a:stretch>
             <a:fillRect/>
           </a:stretch>
@@ -3771,198 +3741,41 @@
           </a:prstGeom>
         </p:spPr>
       </p:pic>
-      <p:grpSp>
-        <p:nvGrpSpPr>
-          <p:cNvPr id="14" name="グループ化 13">
-            <a:extLst>
-              <a:ext uri="{FF2B5EF4-FFF2-40B4-BE49-F238E27FC236}">
-                <a16:creationId xmlns:a16="http://schemas.microsoft.com/office/drawing/2014/main" id="{EFEF1223-8962-933E-B0A1-E87C8F2E6457}"/>
-              </a:ext>
-            </a:extLst>
-          </p:cNvPr>
-          <p:cNvGrpSpPr/>
+      <p:sp>
+        <p:nvSpPr>
+          <p:cNvPr id="16" name="テキスト ボックス 15">
+            <a:extLst>
+              <a:ext uri="{FF2B5EF4-FFF2-40B4-BE49-F238E27FC236}">
+                <a16:creationId xmlns:a16="http://schemas.microsoft.com/office/drawing/2014/main" id="{161CD59E-13EC-BE23-0E79-484ABD693A61}"/>
+              </a:ext>
+            </a:extLst>
+          </p:cNvPr>
+          <p:cNvSpPr txBox="1"/>
           <p:nvPr/>
-        </p:nvGrpSpPr>
-        <p:grpSpPr>
+        </p:nvSpPr>
+        <p:spPr>
           <a:xfrm>
             <a:off x="733391" y="1538007"/>
-            <a:ext cx="5535490" cy="707886"/>
-            <a:chOff x="711900" y="805793"/>
-            <a:chExt cx="5535490" cy="707886"/>
+            <a:ext cx="4671792" cy="707886"/>
           </a:xfrm>
-        </p:grpSpPr>
-        <p:sp>
-          <p:nvSpPr>
-            <p:cNvPr id="15" name="テキスト ボックス 14">
-              <a:extLst>
-                <a:ext uri="{FF2B5EF4-FFF2-40B4-BE49-F238E27FC236}">
-                  <a16:creationId xmlns:a16="http://schemas.microsoft.com/office/drawing/2014/main" id="{70DC3B15-0875-BB7E-4FE5-357DDB96671B}"/>
-                </a:ext>
-              </a:extLst>
-            </p:cNvPr>
-            <p:cNvSpPr txBox="1"/>
-            <p:nvPr/>
-          </p:nvSpPr>
-          <p:spPr>
-            <a:xfrm>
-              <a:off x="711900" y="805793"/>
-              <a:ext cx="5535490" cy="707886"/>
-            </a:xfrm>
-            <a:prstGeom prst="rect">
-              <a:avLst/>
-            </a:prstGeom>
-            <a:noFill/>
-          </p:spPr>
-          <p:txBody>
-            <a:bodyPr wrap="none" rtlCol="0">
-              <a:spAutoFit/>
-            </a:bodyPr>
-            <a:lstStyle/>
-            <a:p>
-              <a:r>
-                <a:rPr lang="ja-JP" altLang="en-US" sz="2000" dirty="0">
-                  <a:ln w="76200">
-                    <a:solidFill>
-                      <a:schemeClr val="bg1"/>
-                    </a:solidFill>
-                  </a:ln>
-                  <a:latin typeface="HGS創英角ｺﾞｼｯｸUB" panose="020B0900000000000000" pitchFamily="50" charset="-128"/>
-                  <a:ea typeface="HGS創英角ｺﾞｼｯｸUB" panose="020B0900000000000000" pitchFamily="50" charset="-128"/>
-                </a:rPr>
-                <a:t>①</a:t>
-              </a:r>
-              <a:r>
-                <a:rPr lang="en-US" altLang="ja-JP" sz="2000" dirty="0">
-                  <a:ln w="76200">
-                    <a:solidFill>
-                      <a:schemeClr val="bg1"/>
-                    </a:solidFill>
-                  </a:ln>
-                  <a:latin typeface="HGS創英角ｺﾞｼｯｸUB" panose="020B0900000000000000" pitchFamily="50" charset="-128"/>
-                  <a:ea typeface="HGS創英角ｺﾞｼｯｸUB" panose="020B0900000000000000" pitchFamily="50" charset="-128"/>
-                </a:rPr>
-                <a:t>	Open the Blueprint Editor, right-click</a:t>
-              </a:r>
-              <a:br>
-                <a:rPr lang="en-US" altLang="ja-JP" sz="2000" dirty="0">
-                  <a:ln w="76200">
-                    <a:solidFill>
-                      <a:schemeClr val="bg1"/>
-                    </a:solidFill>
-                  </a:ln>
-                  <a:latin typeface="HGS創英角ｺﾞｼｯｸUB" panose="020B0900000000000000" pitchFamily="50" charset="-128"/>
-                  <a:ea typeface="HGS創英角ｺﾞｼｯｸUB" panose="020B0900000000000000" pitchFamily="50" charset="-128"/>
-                </a:rPr>
-              </a:br>
-              <a:r>
-                <a:rPr lang="en-US" altLang="ja-JP" sz="2000" dirty="0">
-                  <a:ln w="76200">
-                    <a:solidFill>
-                      <a:schemeClr val="bg1"/>
-                    </a:solidFill>
-                  </a:ln>
-                  <a:latin typeface="HGS創英角ｺﾞｼｯｸUB" panose="020B0900000000000000" pitchFamily="50" charset="-128"/>
-                  <a:ea typeface="HGS創英角ｺﾞｼｯｸUB" panose="020B0900000000000000" pitchFamily="50" charset="-128"/>
-                </a:rPr>
-                <a:t>	and search for “Sort Arbitrary Array.”</a:t>
-              </a:r>
-              <a:endParaRPr lang="ja-JP" altLang="en-US" sz="2000" dirty="0">
-                <a:ln w="76200">
-                  <a:solidFill>
-                    <a:schemeClr val="bg1"/>
-                  </a:solidFill>
-                </a:ln>
-                <a:latin typeface="HGS創英角ｺﾞｼｯｸUB" panose="020B0900000000000000" pitchFamily="50" charset="-128"/>
-                <a:ea typeface="HGS創英角ｺﾞｼｯｸUB" panose="020B0900000000000000" pitchFamily="50" charset="-128"/>
-              </a:endParaRPr>
-            </a:p>
-          </p:txBody>
-        </p:sp>
-        <p:sp>
-          <p:nvSpPr>
-            <p:cNvPr id="16" name="テキスト ボックス 15">
-              <a:extLst>
-                <a:ext uri="{FF2B5EF4-FFF2-40B4-BE49-F238E27FC236}">
-                  <a16:creationId xmlns:a16="http://schemas.microsoft.com/office/drawing/2014/main" id="{161CD59E-13EC-BE23-0E79-484ABD693A61}"/>
-                </a:ext>
-              </a:extLst>
-            </p:cNvPr>
-            <p:cNvSpPr txBox="1"/>
-            <p:nvPr/>
-          </p:nvSpPr>
-          <p:spPr>
-            <a:xfrm>
-              <a:off x="711900" y="805793"/>
-              <a:ext cx="4976362" cy="707886"/>
-            </a:xfrm>
-            <a:prstGeom prst="rect">
-              <a:avLst/>
-            </a:prstGeom>
-            <a:noFill/>
-          </p:spPr>
-          <p:txBody>
-            <a:bodyPr wrap="none" rtlCol="0">
-              <a:spAutoFit/>
-            </a:bodyPr>
-            <a:lstStyle/>
-            <a:p>
-              <a:pPr>
-                <a:tabLst>
-                  <a:tab pos="360363" algn="l"/>
-                </a:tabLst>
-              </a:pPr>
-              <a:r>
-                <a:rPr lang="ja-JP" altLang="en-US" sz="2000" dirty="0">
-                  <a:ln w="57150">
-                    <a:noFill/>
-                  </a:ln>
-                  <a:solidFill>
-                    <a:srgbClr val="FFFF00"/>
-                  </a:solidFill>
-                  <a:latin typeface="HGS創英角ｺﾞｼｯｸUB" panose="020B0900000000000000" pitchFamily="50" charset="-128"/>
-                  <a:ea typeface="HGS創英角ｺﾞｼｯｸUB" panose="020B0900000000000000" pitchFamily="50" charset="-128"/>
-                </a:rPr>
-                <a:t>①</a:t>
-              </a:r>
-              <a:r>
-                <a:rPr lang="en-US" altLang="ja-JP" sz="2000" dirty="0">
-                  <a:ln w="57150">
-                    <a:noFill/>
-                  </a:ln>
-                  <a:solidFill>
-                    <a:srgbClr val="FFFF00"/>
-                  </a:solidFill>
-                  <a:latin typeface="HGS創英角ｺﾞｼｯｸUB" panose="020B0900000000000000" pitchFamily="50" charset="-128"/>
-                  <a:ea typeface="HGS創英角ｺﾞｼｯｸUB" panose="020B0900000000000000" pitchFamily="50" charset="-128"/>
-                </a:rPr>
-                <a:t>	Open the Blueprint Editor, right-click</a:t>
-              </a:r>
-              <a:br>
-                <a:rPr lang="en-US" altLang="ja-JP" sz="2000" dirty="0">
-                  <a:ln w="57150">
-                    <a:noFill/>
-                  </a:ln>
-                  <a:solidFill>
-                    <a:srgbClr val="FFFF00"/>
-                  </a:solidFill>
-                  <a:latin typeface="HGS創英角ｺﾞｼｯｸUB" panose="020B0900000000000000" pitchFamily="50" charset="-128"/>
-                  <a:ea typeface="HGS創英角ｺﾞｼｯｸUB" panose="020B0900000000000000" pitchFamily="50" charset="-128"/>
-                </a:rPr>
-              </a:br>
-              <a:r>
-                <a:rPr lang="en-US" altLang="ja-JP" sz="2000" dirty="0">
-                  <a:ln w="57150">
-                    <a:noFill/>
-                  </a:ln>
-                  <a:solidFill>
-                    <a:srgbClr val="FFFF00"/>
-                  </a:solidFill>
-                  <a:latin typeface="HGS創英角ｺﾞｼｯｸUB" panose="020B0900000000000000" pitchFamily="50" charset="-128"/>
-                  <a:ea typeface="HGS創英角ｺﾞｼｯｸUB" panose="020B0900000000000000" pitchFamily="50" charset="-128"/>
-                </a:rPr>
-                <a:t>	and search for “Sort Arbitrary Array.”</a:t>
-              </a:r>
-              <a:endParaRPr kumimoji="1" lang="ja-JP" altLang="en-US" sz="2000" dirty="0">
+          <a:prstGeom prst="rect">
+            <a:avLst/>
+          </a:prstGeom>
+          <a:noFill/>
+        </p:spPr>
+        <p:txBody>
+          <a:bodyPr wrap="none" rtlCol="0">
+            <a:spAutoFit/>
+          </a:bodyPr>
+          <a:lstStyle/>
+          <a:p>
+            <a:pPr>
+              <a:tabLst>
+                <a:tab pos="360363" algn="l"/>
+              </a:tabLst>
+            </a:pPr>
+            <a:r>
+              <a:rPr lang="ja-JP" altLang="en-US" sz="2000" dirty="0">
                 <a:ln w="57150">
                   <a:noFill/>
                 </a:ln>
@@ -3971,208 +3784,95 @@
                 </a:solidFill>
                 <a:latin typeface="HGS創英角ｺﾞｼｯｸUB" panose="020B0900000000000000" pitchFamily="50" charset="-128"/>
                 <a:ea typeface="HGS創英角ｺﾞｼｯｸUB" panose="020B0900000000000000" pitchFamily="50" charset="-128"/>
-              </a:endParaRPr>
-            </a:p>
-          </p:txBody>
-        </p:sp>
-      </p:grpSp>
-      <p:grpSp>
-        <p:nvGrpSpPr>
-          <p:cNvPr id="17" name="グループ化 16">
-            <a:extLst>
-              <a:ext uri="{FF2B5EF4-FFF2-40B4-BE49-F238E27FC236}">
-                <a16:creationId xmlns:a16="http://schemas.microsoft.com/office/drawing/2014/main" id="{60BA0F5B-A435-093A-B33F-2903C141EA23}"/>
-              </a:ext>
-            </a:extLst>
-          </p:cNvPr>
-          <p:cNvGrpSpPr/>
+              </a:rPr>
+              <a:t>①</a:t>
+            </a:r>
+            <a:r>
+              <a:rPr lang="en-US" altLang="ja-JP" sz="2000" dirty="0">
+                <a:ln w="57150">
+                  <a:noFill/>
+                </a:ln>
+                <a:solidFill>
+                  <a:srgbClr val="FFFF00"/>
+                </a:solidFill>
+                <a:latin typeface="HGS創英角ｺﾞｼｯｸUB" panose="020B0900000000000000" pitchFamily="50" charset="-128"/>
+                <a:ea typeface="HGS創英角ｺﾞｼｯｸUB" panose="020B0900000000000000" pitchFamily="50" charset="-128"/>
+              </a:rPr>
+              <a:t>	Open the Blueprint Editor, right-click</a:t>
+            </a:r>
+            <a:br>
+              <a:rPr lang="en-US" altLang="ja-JP" sz="2000" dirty="0">
+                <a:ln w="57150">
+                  <a:noFill/>
+                </a:ln>
+                <a:solidFill>
+                  <a:srgbClr val="FFFF00"/>
+                </a:solidFill>
+                <a:latin typeface="HGS創英角ｺﾞｼｯｸUB" panose="020B0900000000000000" pitchFamily="50" charset="-128"/>
+                <a:ea typeface="HGS創英角ｺﾞｼｯｸUB" panose="020B0900000000000000" pitchFamily="50" charset="-128"/>
+              </a:rPr>
+            </a:br>
+            <a:r>
+              <a:rPr lang="en-US" altLang="ja-JP" sz="2000" dirty="0">
+                <a:ln w="57150">
+                  <a:noFill/>
+                </a:ln>
+                <a:solidFill>
+                  <a:srgbClr val="FFFF00"/>
+                </a:solidFill>
+                <a:latin typeface="HGS創英角ｺﾞｼｯｸUB" panose="020B0900000000000000" pitchFamily="50" charset="-128"/>
+                <a:ea typeface="HGS創英角ｺﾞｼｯｸUB" panose="020B0900000000000000" pitchFamily="50" charset="-128"/>
+              </a:rPr>
+              <a:t>	and search for “Sort Any Array.”</a:t>
+            </a:r>
+            <a:endParaRPr kumimoji="1" lang="ja-JP" altLang="en-US" sz="2000" dirty="0">
+              <a:ln w="57150">
+                <a:noFill/>
+              </a:ln>
+              <a:solidFill>
+                <a:srgbClr val="FFFF00"/>
+              </a:solidFill>
+              <a:latin typeface="HGS創英角ｺﾞｼｯｸUB" panose="020B0900000000000000" pitchFamily="50" charset="-128"/>
+              <a:ea typeface="HGS創英角ｺﾞｼｯｸUB" panose="020B0900000000000000" pitchFamily="50" charset="-128"/>
+            </a:endParaRPr>
+          </a:p>
+        </p:txBody>
+      </p:sp>
+      <p:sp>
+        <p:nvSpPr>
+          <p:cNvPr id="19" name="テキスト ボックス 18">
+            <a:extLst>
+              <a:ext uri="{FF2B5EF4-FFF2-40B4-BE49-F238E27FC236}">
+                <a16:creationId xmlns:a16="http://schemas.microsoft.com/office/drawing/2014/main" id="{B9F16A1D-5D09-21F4-5A9C-2B377B921A13}"/>
+              </a:ext>
+            </a:extLst>
+          </p:cNvPr>
+          <p:cNvSpPr txBox="1"/>
           <p:nvPr/>
-        </p:nvGrpSpPr>
-        <p:grpSpPr>
+        </p:nvSpPr>
+        <p:spPr>
           <a:xfrm>
             <a:off x="5165696" y="2871693"/>
-            <a:ext cx="6249147" cy="707886"/>
-            <a:chOff x="711900" y="805793"/>
-            <a:chExt cx="6249147" cy="707886"/>
+            <a:ext cx="6247223" cy="707886"/>
           </a:xfrm>
-        </p:grpSpPr>
-        <p:sp>
-          <p:nvSpPr>
-            <p:cNvPr id="18" name="テキスト ボックス 17">
-              <a:extLst>
-                <a:ext uri="{FF2B5EF4-FFF2-40B4-BE49-F238E27FC236}">
-                  <a16:creationId xmlns:a16="http://schemas.microsoft.com/office/drawing/2014/main" id="{BCDD6D52-7AB9-FBD3-B0C6-B6E3A49D6BE3}"/>
-                </a:ext>
-              </a:extLst>
-            </p:cNvPr>
-            <p:cNvSpPr txBox="1"/>
-            <p:nvPr/>
-          </p:nvSpPr>
-          <p:spPr>
-            <a:xfrm>
-              <a:off x="711900" y="805793"/>
-              <a:ext cx="6249147" cy="707886"/>
-            </a:xfrm>
-            <a:prstGeom prst="rect">
-              <a:avLst/>
-            </a:prstGeom>
-            <a:noFill/>
-          </p:spPr>
-          <p:txBody>
-            <a:bodyPr wrap="none" rtlCol="0">
-              <a:spAutoFit/>
-            </a:bodyPr>
-            <a:lstStyle/>
-            <a:p>
-              <a:pPr>
-                <a:tabLst>
-                  <a:tab pos="360363" algn="l"/>
-                </a:tabLst>
-              </a:pPr>
-              <a:r>
-                <a:rPr lang="ja-JP" altLang="en-US" sz="2000" dirty="0">
-                  <a:ln w="76200">
-                    <a:solidFill>
-                      <a:schemeClr val="bg1"/>
-                    </a:solidFill>
-                  </a:ln>
-                  <a:latin typeface="HGS創英角ｺﾞｼｯｸUB" panose="020B0900000000000000" pitchFamily="50" charset="-128"/>
-                  <a:ea typeface="HGS創英角ｺﾞｼｯｸUB" panose="020B0900000000000000" pitchFamily="50" charset="-128"/>
-                </a:rPr>
-                <a:t>②	</a:t>
-              </a:r>
-              <a:r>
-                <a:rPr lang="en-US" altLang="ja-JP" sz="2000" dirty="0">
-                  <a:ln w="76200">
-                    <a:solidFill>
-                      <a:schemeClr val="bg1"/>
-                    </a:solidFill>
-                  </a:ln>
-                  <a:latin typeface="HGS創英角ｺﾞｼｯｸUB" panose="020B0900000000000000" pitchFamily="50" charset="-128"/>
-                  <a:ea typeface="HGS創英角ｺﾞｼｯｸUB" panose="020B0900000000000000" pitchFamily="50" charset="-128"/>
-                </a:rPr>
-                <a:t>Then connect an array of any type you wish to sort</a:t>
-              </a:r>
-              <a:br>
-                <a:rPr lang="en-US" altLang="ja-JP" sz="2000" dirty="0">
-                  <a:ln w="76200">
-                    <a:solidFill>
-                      <a:schemeClr val="bg1"/>
-                    </a:solidFill>
-                  </a:ln>
-                  <a:latin typeface="HGS創英角ｺﾞｼｯｸUB" panose="020B0900000000000000" pitchFamily="50" charset="-128"/>
-                  <a:ea typeface="HGS創英角ｺﾞｼｯｸUB" panose="020B0900000000000000" pitchFamily="50" charset="-128"/>
-                </a:rPr>
-              </a:br>
-              <a:r>
-                <a:rPr lang="en-US" altLang="ja-JP" sz="2000" dirty="0">
-                  <a:ln w="76200">
-                    <a:solidFill>
-                      <a:schemeClr val="bg1"/>
-                    </a:solidFill>
-                  </a:ln>
-                  <a:latin typeface="HGS創英角ｺﾞｼｯｸUB" panose="020B0900000000000000" pitchFamily="50" charset="-128"/>
-                  <a:ea typeface="HGS創英角ｺﾞｼｯｸUB" panose="020B0900000000000000" pitchFamily="50" charset="-128"/>
-                </a:rPr>
-                <a:t>	to the array pin.</a:t>
-              </a:r>
-              <a:endParaRPr lang="ja-JP" altLang="en-US" sz="2000" dirty="0">
-                <a:ln w="76200">
-                  <a:solidFill>
-                    <a:schemeClr val="bg1"/>
-                  </a:solidFill>
-                </a:ln>
-                <a:latin typeface="HGS創英角ｺﾞｼｯｸUB" panose="020B0900000000000000" pitchFamily="50" charset="-128"/>
-                <a:ea typeface="HGS創英角ｺﾞｼｯｸUB" panose="020B0900000000000000" pitchFamily="50" charset="-128"/>
-              </a:endParaRPr>
-            </a:p>
-          </p:txBody>
-        </p:sp>
-        <p:sp>
-          <p:nvSpPr>
-            <p:cNvPr id="19" name="テキスト ボックス 18">
-              <a:extLst>
-                <a:ext uri="{FF2B5EF4-FFF2-40B4-BE49-F238E27FC236}">
-                  <a16:creationId xmlns:a16="http://schemas.microsoft.com/office/drawing/2014/main" id="{B9F16A1D-5D09-21F4-5A9C-2B377B921A13}"/>
-                </a:ext>
-              </a:extLst>
-            </p:cNvPr>
-            <p:cNvSpPr txBox="1"/>
-            <p:nvPr/>
-          </p:nvSpPr>
-          <p:spPr>
-            <a:xfrm>
-              <a:off x="711900" y="805793"/>
-              <a:ext cx="6247223" cy="707886"/>
-            </a:xfrm>
-            <a:prstGeom prst="rect">
-              <a:avLst/>
-            </a:prstGeom>
-            <a:noFill/>
-          </p:spPr>
-          <p:txBody>
-            <a:bodyPr wrap="none" rtlCol="0">
-              <a:spAutoFit/>
-            </a:bodyPr>
-            <a:lstStyle/>
-            <a:p>
-              <a:pPr>
-                <a:tabLst>
-                  <a:tab pos="358775" algn="l"/>
-                </a:tabLst>
-              </a:pPr>
-              <a:r>
-                <a:rPr lang="ja-JP" altLang="en-US" sz="2000" dirty="0">
-                  <a:ln w="57150">
-                    <a:noFill/>
-                  </a:ln>
-                  <a:solidFill>
-                    <a:srgbClr val="FFFF00"/>
-                  </a:solidFill>
-                  <a:latin typeface="HGS創英角ｺﾞｼｯｸUB" panose="020B0900000000000000" pitchFamily="50" charset="-128"/>
-                  <a:ea typeface="HGS創英角ｺﾞｼｯｸUB" panose="020B0900000000000000" pitchFamily="50" charset="-128"/>
-                </a:rPr>
-                <a:t>②</a:t>
-              </a:r>
-              <a:r>
-                <a:rPr lang="en-US" altLang="ja-JP" sz="2000" dirty="0">
-                  <a:ln w="57150">
-                    <a:noFill/>
-                  </a:ln>
-                  <a:solidFill>
-                    <a:srgbClr val="FFFF00"/>
-                  </a:solidFill>
-                  <a:latin typeface="HGS創英角ｺﾞｼｯｸUB" panose="020B0900000000000000" pitchFamily="50" charset="-128"/>
-                  <a:ea typeface="HGS創英角ｺﾞｼｯｸUB" panose="020B0900000000000000" pitchFamily="50" charset="-128"/>
-                </a:rPr>
-                <a:t>	Then connect an array of any type you wish to sort</a:t>
-              </a:r>
-              <a:br>
-                <a:rPr lang="en-US" altLang="ja-JP" sz="2000" dirty="0">
-                  <a:ln w="57150">
-                    <a:noFill/>
-                  </a:ln>
-                  <a:solidFill>
-                    <a:srgbClr val="FFFF00"/>
-                  </a:solidFill>
-                  <a:latin typeface="HGS創英角ｺﾞｼｯｸUB" panose="020B0900000000000000" pitchFamily="50" charset="-128"/>
-                  <a:ea typeface="HGS創英角ｺﾞｼｯｸUB" panose="020B0900000000000000" pitchFamily="50" charset="-128"/>
-                </a:rPr>
-              </a:br>
-              <a:r>
-                <a:rPr lang="en-US" altLang="ja-JP" sz="2000" dirty="0">
-                  <a:ln w="57150">
-                    <a:noFill/>
-                  </a:ln>
-                  <a:solidFill>
-                    <a:srgbClr val="FFFF00"/>
-                  </a:solidFill>
-                  <a:latin typeface="HGS創英角ｺﾞｼｯｸUB" panose="020B0900000000000000" pitchFamily="50" charset="-128"/>
-                  <a:ea typeface="HGS創英角ｺﾞｼｯｸUB" panose="020B0900000000000000" pitchFamily="50" charset="-128"/>
-                </a:rPr>
-                <a:t>	to the array pin.</a:t>
-              </a:r>
-              <a:endParaRPr kumimoji="1" lang="ja-JP" altLang="en-US" sz="2000" dirty="0">
+          <a:prstGeom prst="rect">
+            <a:avLst/>
+          </a:prstGeom>
+          <a:noFill/>
+        </p:spPr>
+        <p:txBody>
+          <a:bodyPr wrap="none" rtlCol="0">
+            <a:spAutoFit/>
+          </a:bodyPr>
+          <a:lstStyle/>
+          <a:p>
+            <a:pPr>
+              <a:tabLst>
+                <a:tab pos="358775" algn="l"/>
+              </a:tabLst>
+            </a:pPr>
+            <a:r>
+              <a:rPr lang="ja-JP" altLang="en-US" sz="2000" dirty="0">
                 <a:ln w="57150">
                   <a:noFill/>
                 </a:ln>
@@ -4181,11 +3881,60 @@
                 </a:solidFill>
                 <a:latin typeface="HGS創英角ｺﾞｼｯｸUB" panose="020B0900000000000000" pitchFamily="50" charset="-128"/>
                 <a:ea typeface="HGS創英角ｺﾞｼｯｸUB" panose="020B0900000000000000" pitchFamily="50" charset="-128"/>
-              </a:endParaRPr>
-            </a:p>
-          </p:txBody>
-        </p:sp>
-      </p:grpSp>
+              </a:rPr>
+              <a:t>②</a:t>
+            </a:r>
+            <a:r>
+              <a:rPr lang="en-US" altLang="ja-JP" sz="2000" dirty="0">
+                <a:ln w="57150">
+                  <a:noFill/>
+                </a:ln>
+                <a:solidFill>
+                  <a:srgbClr val="FFFF00"/>
+                </a:solidFill>
+                <a:latin typeface="HGS創英角ｺﾞｼｯｸUB" panose="020B0900000000000000" pitchFamily="50" charset="-128"/>
+                <a:ea typeface="HGS創英角ｺﾞｼｯｸUB" panose="020B0900000000000000" pitchFamily="50" charset="-128"/>
+              </a:rPr>
+              <a:t>	Then connect an array of any type you wish to sort</a:t>
+            </a:r>
+            <a:br>
+              <a:rPr lang="en-US" altLang="ja-JP" sz="2000" dirty="0">
+                <a:ln w="57150">
+                  <a:noFill/>
+                </a:ln>
+                <a:solidFill>
+                  <a:srgbClr val="FFFF00"/>
+                </a:solidFill>
+                <a:latin typeface="HGS創英角ｺﾞｼｯｸUB" panose="020B0900000000000000" pitchFamily="50" charset="-128"/>
+                <a:ea typeface="HGS創英角ｺﾞｼｯｸUB" panose="020B0900000000000000" pitchFamily="50" charset="-128"/>
+              </a:rPr>
+            </a:br>
+            <a:r>
+              <a:rPr lang="en-US" altLang="ja-JP" sz="2000" dirty="0">
+                <a:ln w="57150">
+                  <a:noFill/>
+                </a:ln>
+                <a:solidFill>
+                  <a:srgbClr val="FFFF00"/>
+                </a:solidFill>
+                <a:latin typeface="HGS創英角ｺﾞｼｯｸUB" panose="020B0900000000000000" pitchFamily="50" charset="-128"/>
+                <a:ea typeface="HGS創英角ｺﾞｼｯｸUB" panose="020B0900000000000000" pitchFamily="50" charset="-128"/>
+              </a:rPr>
+              <a:t>	to the array pin.</a:t>
+            </a:r>
+            <a:endParaRPr kumimoji="1" lang="ja-JP" altLang="en-US" sz="2000" dirty="0">
+              <a:ln w="57150">
+                <a:noFill/>
+              </a:ln>
+              <a:solidFill>
+                <a:srgbClr val="FFFF00"/>
+              </a:solidFill>
+              <a:latin typeface="HGS創英角ｺﾞｼｯｸUB" panose="020B0900000000000000" pitchFamily="50" charset="-128"/>
+              <a:ea typeface="HGS創英角ｺﾞｼｯｸUB" panose="020B0900000000000000" pitchFamily="50" charset="-128"/>
+            </a:endParaRPr>
+          </a:p>
+        </p:txBody>
+      </p:sp>
       <p:sp>
         <p:nvSpPr>
           <p:cNvPr id="20" name="テキスト ボックス 19">
@@ -4256,6 +4005,36 @@
           </a:p>
         </p:txBody>
       </p:sp>
+      <p:pic>
+        <p:nvPicPr>
+          <p:cNvPr id="3" name="図 2">
+            <a:extLst>
+              <a:ext uri="{FF2B5EF4-FFF2-40B4-BE49-F238E27FC236}">
+                <a16:creationId xmlns:a16="http://schemas.microsoft.com/office/drawing/2014/main" id="{525108E6-78A3-9E7B-BD8A-F761BE16AD67}"/>
+              </a:ext>
+            </a:extLst>
+          </p:cNvPr>
+          <p:cNvPicPr>
+            <a:picLocks noChangeAspect="1"/>
+          </p:cNvPicPr>
+          <p:nvPr/>
+        </p:nvPicPr>
+        <p:blipFill>
+          <a:blip r:embed="rId3"/>
+          <a:stretch>
+            <a:fillRect/>
+          </a:stretch>
+        </p:blipFill>
+        <p:spPr>
+          <a:xfrm>
+            <a:off x="828401" y="2283417"/>
+            <a:ext cx="3896269" cy="3924848"/>
+          </a:xfrm>
+          <a:prstGeom prst="rect">
+            <a:avLst/>
+          </a:prstGeom>
+        </p:spPr>
+      </p:pic>
     </p:spTree>
     <p:extLst>
       <p:ext uri="{BB962C8B-B14F-4D97-AF65-F5344CB8AC3E}">

</xml_diff>